<commit_message>
Update documention on integration and unit tests.
</commit_message>
<xml_diff>
--- a/specification/diagrams/OW-Programming-Model-Slides.pptx
+++ b/specification/diagrams/OW-Programming-Model-Slides.pptx
@@ -244,7 +244,7 @@
           <a:p>
             <a:fld id="{1A61ACA8-5F20-D145-A6C7-83D42D24FB84}" type="datetimeFigureOut">
               <a:rPr lang="en-US" smtClean="0"/>
-              <a:t>11/8/16</a:t>
+              <a:t>7/18/17</a:t>
             </a:fld>
             <a:endParaRPr lang="en-US"/>
           </a:p>
@@ -414,7 +414,7 @@
           <a:p>
             <a:fld id="{1A61ACA8-5F20-D145-A6C7-83D42D24FB84}" type="datetimeFigureOut">
               <a:rPr lang="en-US" smtClean="0"/>
-              <a:t>11/8/16</a:t>
+              <a:t>7/18/17</a:t>
             </a:fld>
             <a:endParaRPr lang="en-US"/>
           </a:p>
@@ -594,7 +594,7 @@
           <a:p>
             <a:fld id="{1A61ACA8-5F20-D145-A6C7-83D42D24FB84}" type="datetimeFigureOut">
               <a:rPr lang="en-US" smtClean="0"/>
-              <a:t>11/8/16</a:t>
+              <a:t>7/18/17</a:t>
             </a:fld>
             <a:endParaRPr lang="en-US"/>
           </a:p>
@@ -764,7 +764,7 @@
           <a:p>
             <a:fld id="{1A61ACA8-5F20-D145-A6C7-83D42D24FB84}" type="datetimeFigureOut">
               <a:rPr lang="en-US" smtClean="0"/>
-              <a:t>11/8/16</a:t>
+              <a:t>7/18/17</a:t>
             </a:fld>
             <a:endParaRPr lang="en-US"/>
           </a:p>
@@ -1010,7 +1010,7 @@
           <a:p>
             <a:fld id="{1A61ACA8-5F20-D145-A6C7-83D42D24FB84}" type="datetimeFigureOut">
               <a:rPr lang="en-US" smtClean="0"/>
-              <a:t>11/8/16</a:t>
+              <a:t>7/18/17</a:t>
             </a:fld>
             <a:endParaRPr lang="en-US"/>
           </a:p>
@@ -1242,7 +1242,7 @@
           <a:p>
             <a:fld id="{1A61ACA8-5F20-D145-A6C7-83D42D24FB84}" type="datetimeFigureOut">
               <a:rPr lang="en-US" smtClean="0"/>
-              <a:t>11/8/16</a:t>
+              <a:t>7/18/17</a:t>
             </a:fld>
             <a:endParaRPr lang="en-US"/>
           </a:p>
@@ -1609,7 +1609,7 @@
           <a:p>
             <a:fld id="{1A61ACA8-5F20-D145-A6C7-83D42D24FB84}" type="datetimeFigureOut">
               <a:rPr lang="en-US" smtClean="0"/>
-              <a:t>11/8/16</a:t>
+              <a:t>7/18/17</a:t>
             </a:fld>
             <a:endParaRPr lang="en-US"/>
           </a:p>
@@ -1727,7 +1727,7 @@
           <a:p>
             <a:fld id="{1A61ACA8-5F20-D145-A6C7-83D42D24FB84}" type="datetimeFigureOut">
               <a:rPr lang="en-US" smtClean="0"/>
-              <a:t>11/8/16</a:t>
+              <a:t>7/18/17</a:t>
             </a:fld>
             <a:endParaRPr lang="en-US"/>
           </a:p>
@@ -1822,7 +1822,7 @@
           <a:p>
             <a:fld id="{1A61ACA8-5F20-D145-A6C7-83D42D24FB84}" type="datetimeFigureOut">
               <a:rPr lang="en-US" smtClean="0"/>
-              <a:t>11/8/16</a:t>
+              <a:t>7/18/17</a:t>
             </a:fld>
             <a:endParaRPr lang="en-US"/>
           </a:p>
@@ -2099,7 +2099,7 @@
           <a:p>
             <a:fld id="{1A61ACA8-5F20-D145-A6C7-83D42D24FB84}" type="datetimeFigureOut">
               <a:rPr lang="en-US" smtClean="0"/>
-              <a:t>11/8/16</a:t>
+              <a:t>7/18/17</a:t>
             </a:fld>
             <a:endParaRPr lang="en-US"/>
           </a:p>
@@ -2352,7 +2352,7 @@
           <a:p>
             <a:fld id="{1A61ACA8-5F20-D145-A6C7-83D42D24FB84}" type="datetimeFigureOut">
               <a:rPr lang="en-US" smtClean="0"/>
-              <a:t>11/8/16</a:t>
+              <a:t>7/18/17</a:t>
             </a:fld>
             <a:endParaRPr lang="en-US"/>
           </a:p>
@@ -2565,7 +2565,7 @@
           <a:p>
             <a:fld id="{1A61ACA8-5F20-D145-A6C7-83D42D24FB84}" type="datetimeFigureOut">
               <a:rPr lang="en-US" smtClean="0"/>
-              <a:t>11/8/16</a:t>
+              <a:t>7/18/17</a:t>
             </a:fld>
             <a:endParaRPr lang="en-US"/>
           </a:p>
@@ -3522,7 +3522,19 @@
             </a:r>
             <a:r>
               <a:rPr lang="en-US" sz="1200" dirty="0" smtClean="0"/>
-              <a:t> Serverless code, including:</a:t>
+              <a:t> </a:t>
+            </a:r>
+            <a:r>
+              <a:rPr lang="en-US" sz="1200" dirty="0" smtClean="0"/>
+              <a:t>OpenWhisk Package  code </a:t>
+            </a:r>
+            <a:r>
+              <a:rPr lang="en-US" sz="1200" i="1" dirty="0" smtClean="0"/>
+              <a:t>(e.g., GitHub, Object Storage), </a:t>
+            </a:r>
+            <a:r>
+              <a:rPr lang="en-US" sz="1200" dirty="0" smtClean="0"/>
+              <a:t>including:</a:t>
             </a:r>
           </a:p>
           <a:p>
@@ -3689,8 +3701,21 @@
             </a:r>
             <a:r>
               <a:rPr lang="en-US" sz="1200" dirty="0" smtClean="0"/>
-              <a:t> which describes the Serverless service’s:</a:t>
-            </a:r>
+              <a:t> </a:t>
+            </a:r>
+            <a:r>
+              <a:rPr lang="en-US" sz="1200" dirty="0" smtClean="0"/>
+              <a:t>(</a:t>
+            </a:r>
+            <a:r>
+              <a:rPr lang="en-US" sz="1200" i="1" dirty="0" err="1" smtClean="0"/>
+              <a:t>manifest.yaml</a:t>
+            </a:r>
+            <a:r>
+              <a:rPr lang="en-US" sz="1200" dirty="0" smtClean="0"/>
+              <a:t>) in the Package repository which describes its:</a:t>
+            </a:r>
+            <a:endParaRPr lang="en-US" sz="1200" dirty="0" smtClean="0"/>
           </a:p>
           <a:p>
             <a:pPr marL="288925" lvl="1" indent="-117475">
@@ -3698,8 +3723,8 @@
               <a:buChar char="•"/>
             </a:pPr>
             <a:r>
-              <a:rPr lang="en-US" sz="1200" dirty="0" smtClean="0"/>
-              <a:t>Repositories (source code locations) </a:t>
+              <a:rPr lang="en-US" sz="1200" dirty="0"/>
+              <a:t>Actions, Compositions</a:t>
             </a:r>
           </a:p>
           <a:p>
@@ -3708,9 +3733,14 @@
               <a:buChar char="•"/>
             </a:pPr>
             <a:r>
+              <a:rPr lang="en-US" sz="1200" dirty="0"/>
+              <a:t>Triggers and </a:t>
+            </a:r>
+            <a:r>
               <a:rPr lang="en-US" sz="1200" dirty="0" smtClean="0"/>
-              <a:t>Parameter schema (for Actions and Feeds)</a:t>
-            </a:r>
+              <a:t>Rules</a:t>
+            </a:r>
+            <a:endParaRPr lang="en-US" sz="1200" dirty="0" smtClean="0"/>
           </a:p>
           <a:p>
             <a:pPr marL="288925" lvl="1" indent="-117475">
@@ -3718,9 +3748,14 @@
               <a:buChar char="•"/>
             </a:pPr>
             <a:r>
+              <a:rPr lang="en-US" sz="1200" dirty="0"/>
+              <a:t>Parameter schema (for Actions and Feeds</a:t>
+            </a:r>
+            <a:r>
               <a:rPr lang="en-US" sz="1200" dirty="0" smtClean="0"/>
-              <a:t>Configuration and Lifecycle APIs for Feeds</a:t>
-            </a:r>
+              <a:t>)</a:t>
+            </a:r>
+            <a:endParaRPr lang="en-US" sz="1200" dirty="0" smtClean="0"/>
           </a:p>
           <a:p>
             <a:pPr marL="288925" lvl="1" indent="-117475">
@@ -3729,7 +3764,11 @@
             </a:pPr>
             <a:r>
               <a:rPr lang="en-US" sz="1200" dirty="0" smtClean="0"/>
-              <a:t>Event Sources (and corresponding Event schema)</a:t>
+              <a:t>Repositories </a:t>
+            </a:r>
+            <a:r>
+              <a:rPr lang="en-US" sz="1200" i="1" dirty="0" smtClean="0"/>
+              <a:t>(source code locations) </a:t>
             </a:r>
           </a:p>
           <a:p>
@@ -3739,7 +3778,11 @@
             </a:pPr>
             <a:r>
               <a:rPr lang="en-US" sz="1200" dirty="0" smtClean="0"/>
-              <a:t>Triggers and Rules</a:t>
+              <a:t>Configuration </a:t>
+            </a:r>
+            <a:r>
+              <a:rPr lang="en-US" sz="1200" dirty="0" smtClean="0"/>
+              <a:t>and Lifecycle APIs for Feeds</a:t>
             </a:r>
           </a:p>
           <a:p>
@@ -3749,7 +3792,11 @@
             </a:pPr>
             <a:r>
               <a:rPr lang="en-US" sz="1200" dirty="0" smtClean="0"/>
-              <a:t>Compositions of Actions</a:t>
+              <a:t>Event Sources </a:t>
+            </a:r>
+            <a:r>
+              <a:rPr lang="en-US" sz="1200" i="1" dirty="0" smtClean="0"/>
+              <a:t>(and corresponding Event schema)</a:t>
             </a:r>
           </a:p>
           <a:p>
@@ -3759,9 +3806,13 @@
             </a:pPr>
             <a:r>
               <a:rPr lang="en-US" sz="1200" dirty="0" smtClean="0"/>
-              <a:t>Annotations (tags, User Interface hints, etc.)</a:t>
-            </a:r>
-            <a:endParaRPr lang="en-US" dirty="0" smtClean="0"/>
+              <a:t>Annotations </a:t>
+            </a:r>
+            <a:r>
+              <a:rPr lang="en-US" sz="1200" i="1" dirty="0" smtClean="0"/>
+              <a:t>(tags, User Interface hints, etc.)</a:t>
+            </a:r>
+            <a:endParaRPr lang="en-US" i="1" dirty="0" smtClean="0"/>
           </a:p>
         </p:txBody>
       </p:sp>

</xml_diff>